<commit_message>
doc: Powe point añadir issues,projects,milestones, convención de commits y github actions
</commit_message>
<xml_diff>
--- a/GitHUb_presentación.pptx
+++ b/GitHUb_presentación.pptx
@@ -5,10 +5,10 @@
     <p:sldMasterId id="2147483672" r:id="rId1"/>
   </p:sldMasterIdLst>
   <p:notesMasterIdLst>
-    <p:notesMasterId r:id="rId9"/>
+    <p:notesMasterId r:id="rId17"/>
   </p:notesMasterIdLst>
   <p:handoutMasterIdLst>
-    <p:handoutMasterId r:id="rId10"/>
+    <p:handoutMasterId r:id="rId18"/>
   </p:handoutMasterIdLst>
   <p:sldIdLst>
     <p:sldId id="256" r:id="rId2"/>
@@ -18,6 +18,14 @@
     <p:sldId id="260" r:id="rId6"/>
     <p:sldId id="261" r:id="rId7"/>
     <p:sldId id="262" r:id="rId8"/>
+    <p:sldId id="263" r:id="rId9"/>
+    <p:sldId id="266" r:id="rId10"/>
+    <p:sldId id="264" r:id="rId11"/>
+    <p:sldId id="265" r:id="rId12"/>
+    <p:sldId id="267" r:id="rId13"/>
+    <p:sldId id="268" r:id="rId14"/>
+    <p:sldId id="269" r:id="rId15"/>
+    <p:sldId id="270" r:id="rId16"/>
   </p:sldIdLst>
   <p:sldSz cx="12192000" cy="6858000"/>
   <p:notesSz cx="6858000" cy="9144000"/>
@@ -5037,6 +5045,1519 @@
 </p:sld>
 </file>
 
+<file path=ppt/slides/slide10.xml><?xml version="1.0" encoding="utf-8"?>
+<p:sld xmlns:a="http://schemas.openxmlformats.org/drawingml/2006/main" xmlns:r="http://schemas.openxmlformats.org/officeDocument/2006/relationships" xmlns:p="http://schemas.openxmlformats.org/presentationml/2006/main">
+  <p:cSld>
+    <p:spTree>
+      <p:nvGrpSpPr>
+        <p:cNvPr id="1" name=""/>
+        <p:cNvGrpSpPr/>
+        <p:nvPr/>
+      </p:nvGrpSpPr>
+      <p:grpSpPr>
+        <a:xfrm>
+          <a:off x="0" y="0"/>
+          <a:ext cx="0" cy="0"/>
+          <a:chOff x="0" y="0"/>
+          <a:chExt cx="0" cy="0"/>
+        </a:xfrm>
+      </p:grpSpPr>
+      <p:sp>
+        <p:nvSpPr>
+          <p:cNvPr id="2" name="Título 1">
+            <a:extLst>
+              <a:ext uri="{FF2B5EF4-FFF2-40B4-BE49-F238E27FC236}">
+                <a16:creationId xmlns:a16="http://schemas.microsoft.com/office/drawing/2014/main" id="{0D51AB71-FEF8-6457-33FA-40C7A34BB6D3}"/>
+              </a:ext>
+            </a:extLst>
+          </p:cNvPr>
+          <p:cNvSpPr>
+            <a:spLocks noGrp="1"/>
+          </p:cNvSpPr>
+          <p:nvPr>
+            <p:ph type="title"/>
+          </p:nvPr>
+        </p:nvSpPr>
+        <p:spPr/>
+        <p:txBody>
+          <a:bodyPr/>
+          <a:lstStyle/>
+          <a:p>
+            <a:r>
+              <a:rPr lang="es-ES" dirty="0" err="1"/>
+              <a:t>Projects</a:t>
+            </a:r>
+            <a:endParaRPr lang="es-ES" dirty="0"/>
+          </a:p>
+        </p:txBody>
+      </p:sp>
+      <p:sp>
+        <p:nvSpPr>
+          <p:cNvPr id="3" name="Marcador de contenido 2">
+            <a:extLst>
+              <a:ext uri="{FF2B5EF4-FFF2-40B4-BE49-F238E27FC236}">
+                <a16:creationId xmlns:a16="http://schemas.microsoft.com/office/drawing/2014/main" id="{3DF7DFC5-A75B-4745-C3F4-4C383617021C}"/>
+              </a:ext>
+            </a:extLst>
+          </p:cNvPr>
+          <p:cNvSpPr>
+            <a:spLocks noGrp="1"/>
+          </p:cNvSpPr>
+          <p:nvPr>
+            <p:ph idx="1"/>
+          </p:nvPr>
+        </p:nvSpPr>
+        <p:spPr>
+          <a:xfrm>
+            <a:off x="581193" y="2515777"/>
+            <a:ext cx="11029615" cy="1248504"/>
+          </a:xfrm>
+        </p:spPr>
+        <p:txBody>
+          <a:bodyPr/>
+          <a:lstStyle/>
+          <a:p>
+            <a:pPr marL="0" indent="0">
+              <a:buNone/>
+            </a:pPr>
+            <a:r>
+              <a:rPr lang="es-ES" dirty="0"/>
+              <a:t>Los </a:t>
+            </a:r>
+            <a:r>
+              <a:rPr lang="es-ES" dirty="0" err="1"/>
+              <a:t>Projects</a:t>
+            </a:r>
+            <a:r>
+              <a:rPr lang="es-ES" dirty="0"/>
+              <a:t> permiten organizar los Issues en forma de un tablero Kanban. </a:t>
+            </a:r>
+          </a:p>
+          <a:p>
+            <a:pPr marL="0" indent="0">
+              <a:buNone/>
+            </a:pPr>
+            <a:r>
+              <a:rPr lang="es-ES" dirty="0"/>
+              <a:t>Sirve para visualizar el estado del proyecto y ver quién está haciendo cada cosa.</a:t>
+            </a:r>
+          </a:p>
+          <a:p>
+            <a:endParaRPr lang="es-ES" b="0" dirty="0">
+              <a:solidFill>
+                <a:srgbClr val="3B3B3B"/>
+              </a:solidFill>
+              <a:effectLst/>
+              <a:latin typeface="Consolas" panose="020B0609020204030204" pitchFamily="49" charset="0"/>
+            </a:endParaRPr>
+          </a:p>
+          <a:p>
+            <a:endParaRPr lang="es-ES" dirty="0"/>
+          </a:p>
+        </p:txBody>
+      </p:sp>
+      <p:pic>
+        <p:nvPicPr>
+          <p:cNvPr id="5" name="Imagen 4">
+            <a:extLst>
+              <a:ext uri="{FF2B5EF4-FFF2-40B4-BE49-F238E27FC236}">
+                <a16:creationId xmlns:a16="http://schemas.microsoft.com/office/drawing/2014/main" id="{6CE9F202-E268-8E4C-5D74-72B86E78D7BE}"/>
+              </a:ext>
+            </a:extLst>
+          </p:cNvPr>
+          <p:cNvPicPr>
+            <a:picLocks noChangeAspect="1"/>
+          </p:cNvPicPr>
+          <p:nvPr/>
+        </p:nvPicPr>
+        <p:blipFill>
+          <a:blip r:embed="rId2"/>
+          <a:stretch>
+            <a:fillRect/>
+          </a:stretch>
+        </p:blipFill>
+        <p:spPr>
+          <a:xfrm>
+            <a:off x="581192" y="3140029"/>
+            <a:ext cx="9865360" cy="3514132"/>
+          </a:xfrm>
+          <a:prstGeom prst="rect">
+            <a:avLst/>
+          </a:prstGeom>
+        </p:spPr>
+      </p:pic>
+    </p:spTree>
+    <p:extLst>
+      <p:ext uri="{BB962C8B-B14F-4D97-AF65-F5344CB8AC3E}">
+        <p14:creationId xmlns:p14="http://schemas.microsoft.com/office/powerpoint/2010/main" val="3268195732"/>
+      </p:ext>
+    </p:extLst>
+  </p:cSld>
+  <p:clrMapOvr>
+    <a:masterClrMapping/>
+  </p:clrMapOvr>
+</p:sld>
+</file>
+
+<file path=ppt/slides/slide11.xml><?xml version="1.0" encoding="utf-8"?>
+<p:sld xmlns:a="http://schemas.openxmlformats.org/drawingml/2006/main" xmlns:r="http://schemas.openxmlformats.org/officeDocument/2006/relationships" xmlns:p="http://schemas.openxmlformats.org/presentationml/2006/main">
+  <p:cSld>
+    <p:spTree>
+      <p:nvGrpSpPr>
+        <p:cNvPr id="1" name=""/>
+        <p:cNvGrpSpPr/>
+        <p:nvPr/>
+      </p:nvGrpSpPr>
+      <p:grpSpPr>
+        <a:xfrm>
+          <a:off x="0" y="0"/>
+          <a:ext cx="0" cy="0"/>
+          <a:chOff x="0" y="0"/>
+          <a:chExt cx="0" cy="0"/>
+        </a:xfrm>
+      </p:grpSpPr>
+      <p:sp>
+        <p:nvSpPr>
+          <p:cNvPr id="2" name="Título 1">
+            <a:extLst>
+              <a:ext uri="{FF2B5EF4-FFF2-40B4-BE49-F238E27FC236}">
+                <a16:creationId xmlns:a16="http://schemas.microsoft.com/office/drawing/2014/main" id="{E3BEA5DB-2477-F6F2-34BC-306DBF367553}"/>
+              </a:ext>
+            </a:extLst>
+          </p:cNvPr>
+          <p:cNvSpPr>
+            <a:spLocks noGrp="1"/>
+          </p:cNvSpPr>
+          <p:nvPr>
+            <p:ph type="title"/>
+          </p:nvPr>
+        </p:nvSpPr>
+        <p:spPr/>
+        <p:txBody>
+          <a:bodyPr/>
+          <a:lstStyle/>
+          <a:p>
+            <a:r>
+              <a:rPr lang="es-ES" dirty="0"/>
+              <a:t>MILESTONES</a:t>
+            </a:r>
+          </a:p>
+        </p:txBody>
+      </p:sp>
+      <p:sp>
+        <p:nvSpPr>
+          <p:cNvPr id="3" name="Marcador de contenido 2">
+            <a:extLst>
+              <a:ext uri="{FF2B5EF4-FFF2-40B4-BE49-F238E27FC236}">
+                <a16:creationId xmlns:a16="http://schemas.microsoft.com/office/drawing/2014/main" id="{18B53FB1-E9D3-F876-4F45-255EB4A62340}"/>
+              </a:ext>
+            </a:extLst>
+          </p:cNvPr>
+          <p:cNvSpPr>
+            <a:spLocks noGrp="1"/>
+          </p:cNvSpPr>
+          <p:nvPr>
+            <p:ph idx="1"/>
+          </p:nvPr>
+        </p:nvSpPr>
+        <p:spPr>
+          <a:xfrm>
+            <a:off x="581192" y="2404017"/>
+            <a:ext cx="11029615" cy="1649823"/>
+          </a:xfrm>
+        </p:spPr>
+        <p:txBody>
+          <a:bodyPr/>
+          <a:lstStyle/>
+          <a:p>
+            <a:pPr marL="0" indent="0">
+              <a:buNone/>
+            </a:pPr>
+            <a:r>
+              <a:rPr lang="es-ES" dirty="0"/>
+              <a:t>Un </a:t>
+            </a:r>
+            <a:r>
+              <a:rPr lang="es-ES" dirty="0" err="1"/>
+              <a:t>Milestone</a:t>
+            </a:r>
+            <a:r>
+              <a:rPr lang="es-ES" dirty="0"/>
+              <a:t> es una meta concreta que agrupa varios Issues relacionados. Se puede usar, por ejemplo, para agrupar todas las tareas necesarias para una entrega del proyecto o una versión.</a:t>
+            </a:r>
+          </a:p>
+          <a:p>
+            <a:pPr marL="0" indent="0">
+              <a:buNone/>
+            </a:pPr>
+            <a:r>
+              <a:rPr lang="es-ES" dirty="0"/>
+              <a:t>Permiten llevar control de cuánto se ha completado y qué falta para alcanzar un objetivo mayor.</a:t>
+            </a:r>
+          </a:p>
+          <a:p>
+            <a:endParaRPr lang="es-ES" dirty="0"/>
+          </a:p>
+          <a:p>
+            <a:endParaRPr lang="es-ES" dirty="0"/>
+          </a:p>
+        </p:txBody>
+      </p:sp>
+      <p:pic>
+        <p:nvPicPr>
+          <p:cNvPr id="8194" name="Picture 2" descr="Meta - Iconos gratis de negocios y finanzas">
+            <a:extLst>
+              <a:ext uri="{FF2B5EF4-FFF2-40B4-BE49-F238E27FC236}">
+                <a16:creationId xmlns:a16="http://schemas.microsoft.com/office/drawing/2014/main" id="{661B8C36-EB4F-519A-6581-3ADCBE69EF07}"/>
+              </a:ext>
+            </a:extLst>
+          </p:cNvPr>
+          <p:cNvPicPr>
+            <a:picLocks noChangeAspect="1" noChangeArrowheads="1"/>
+          </p:cNvPicPr>
+          <p:nvPr/>
+        </p:nvPicPr>
+        <p:blipFill>
+          <a:blip r:embed="rId2">
+            <a:extLst>
+              <a:ext uri="{28A0092B-C50C-407E-A947-70E740481C1C}">
+                <a14:useLocalDpi xmlns:a14="http://schemas.microsoft.com/office/drawing/2010/main" val="0"/>
+              </a:ext>
+            </a:extLst>
+          </a:blip>
+          <a:srcRect/>
+          <a:stretch>
+            <a:fillRect/>
+          </a:stretch>
+        </p:blipFill>
+        <p:spPr bwMode="auto">
+          <a:xfrm>
+            <a:off x="7874000" y="3429000"/>
+            <a:ext cx="3261360" cy="3261360"/>
+          </a:xfrm>
+          <a:prstGeom prst="rect">
+            <a:avLst/>
+          </a:prstGeom>
+          <a:noFill/>
+          <a:extLst>
+            <a:ext uri="{909E8E84-426E-40DD-AFC4-6F175D3DCCD1}">
+              <a14:hiddenFill xmlns:a14="http://schemas.microsoft.com/office/drawing/2010/main">
+                <a:solidFill>
+                  <a:srgbClr val="FFFFFF"/>
+                </a:solidFill>
+              </a14:hiddenFill>
+            </a:ext>
+          </a:extLst>
+        </p:spPr>
+      </p:pic>
+    </p:spTree>
+    <p:extLst>
+      <p:ext uri="{BB962C8B-B14F-4D97-AF65-F5344CB8AC3E}">
+        <p14:creationId xmlns:p14="http://schemas.microsoft.com/office/powerpoint/2010/main" val="247039977"/>
+      </p:ext>
+    </p:extLst>
+  </p:cSld>
+  <p:clrMapOvr>
+    <a:masterClrMapping/>
+  </p:clrMapOvr>
+</p:sld>
+</file>
+
+<file path=ppt/slides/slide12.xml><?xml version="1.0" encoding="utf-8"?>
+<p:sld xmlns:a="http://schemas.openxmlformats.org/drawingml/2006/main" xmlns:r="http://schemas.openxmlformats.org/officeDocument/2006/relationships" xmlns:p="http://schemas.openxmlformats.org/presentationml/2006/main">
+  <p:cSld>
+    <p:spTree>
+      <p:nvGrpSpPr>
+        <p:cNvPr id="1" name=""/>
+        <p:cNvGrpSpPr/>
+        <p:nvPr/>
+      </p:nvGrpSpPr>
+      <p:grpSpPr>
+        <a:xfrm>
+          <a:off x="0" y="0"/>
+          <a:ext cx="0" cy="0"/>
+          <a:chOff x="0" y="0"/>
+          <a:chExt cx="0" cy="0"/>
+        </a:xfrm>
+      </p:grpSpPr>
+      <p:sp>
+        <p:nvSpPr>
+          <p:cNvPr id="5" name="Rectángulo 4">
+            <a:extLst>
+              <a:ext uri="{FF2B5EF4-FFF2-40B4-BE49-F238E27FC236}">
+                <a16:creationId xmlns:a16="http://schemas.microsoft.com/office/drawing/2014/main" id="{0AAC5133-FC45-AF9D-8CB1-D320D0FC3FD0}"/>
+              </a:ext>
+            </a:extLst>
+          </p:cNvPr>
+          <p:cNvSpPr/>
+          <p:nvPr/>
+        </p:nvSpPr>
+        <p:spPr>
+          <a:xfrm>
+            <a:off x="581192" y="3535680"/>
+            <a:ext cx="11112968" cy="2489200"/>
+          </a:xfrm>
+          <a:prstGeom prst="rect">
+            <a:avLst/>
+          </a:prstGeom>
+        </p:spPr>
+        <p:style>
+          <a:lnRef idx="2">
+            <a:schemeClr val="accent1">
+              <a:shade val="15000"/>
+            </a:schemeClr>
+          </a:lnRef>
+          <a:fillRef idx="1">
+            <a:schemeClr val="accent1"/>
+          </a:fillRef>
+          <a:effectRef idx="0">
+            <a:schemeClr val="accent1"/>
+          </a:effectRef>
+          <a:fontRef idx="minor">
+            <a:schemeClr val="lt1"/>
+          </a:fontRef>
+        </p:style>
+        <p:txBody>
+          <a:bodyPr rtlCol="0" anchor="ctr"/>
+          <a:lstStyle/>
+          <a:p>
+            <a:pPr algn="ctr"/>
+            <a:endParaRPr lang="es-ES"/>
+          </a:p>
+        </p:txBody>
+      </p:sp>
+      <p:sp>
+        <p:nvSpPr>
+          <p:cNvPr id="2" name="Título 1">
+            <a:extLst>
+              <a:ext uri="{FF2B5EF4-FFF2-40B4-BE49-F238E27FC236}">
+                <a16:creationId xmlns:a16="http://schemas.microsoft.com/office/drawing/2014/main" id="{DD4A879B-3CC7-5088-63FE-318A19BFB7C8}"/>
+              </a:ext>
+            </a:extLst>
+          </p:cNvPr>
+          <p:cNvSpPr>
+            <a:spLocks noGrp="1"/>
+          </p:cNvSpPr>
+          <p:nvPr>
+            <p:ph type="title"/>
+          </p:nvPr>
+        </p:nvSpPr>
+        <p:spPr>
+          <a:xfrm>
+            <a:off x="581192" y="1166696"/>
+            <a:ext cx="11029616" cy="1013800"/>
+          </a:xfrm>
+        </p:spPr>
+        <p:txBody>
+          <a:bodyPr/>
+          <a:lstStyle/>
+          <a:p>
+            <a:r>
+              <a:rPr lang="es-ES" dirty="0"/>
+              <a:t>Convenciones de </a:t>
+            </a:r>
+            <a:r>
+              <a:rPr lang="es-ES" dirty="0" err="1"/>
+              <a:t>Commits</a:t>
+            </a:r>
+            <a:r>
+              <a:rPr lang="es-ES" dirty="0"/>
+              <a:t> y Nombres de Ramas</a:t>
+            </a:r>
+            <a:br>
+              <a:rPr lang="es-ES" b="0" dirty="0">
+                <a:solidFill>
+                  <a:srgbClr val="3B3B3B"/>
+                </a:solidFill>
+                <a:effectLst/>
+                <a:latin typeface="Consolas" panose="020B0609020204030204" pitchFamily="49" charset="0"/>
+              </a:rPr>
+            </a:br>
+            <a:endParaRPr lang="es-ES" dirty="0"/>
+          </a:p>
+        </p:txBody>
+      </p:sp>
+      <p:sp>
+        <p:nvSpPr>
+          <p:cNvPr id="3" name="Marcador de contenido 2">
+            <a:extLst>
+              <a:ext uri="{FF2B5EF4-FFF2-40B4-BE49-F238E27FC236}">
+                <a16:creationId xmlns:a16="http://schemas.microsoft.com/office/drawing/2014/main" id="{7E397767-CA18-445F-AA0A-FEC073C31094}"/>
+              </a:ext>
+            </a:extLst>
+          </p:cNvPr>
+          <p:cNvSpPr>
+            <a:spLocks noGrp="1"/>
+          </p:cNvSpPr>
+          <p:nvPr>
+            <p:ph idx="1"/>
+          </p:nvPr>
+        </p:nvSpPr>
+        <p:spPr>
+          <a:xfrm>
+            <a:off x="581192" y="1946817"/>
+            <a:ext cx="11029615" cy="1700624"/>
+          </a:xfrm>
+        </p:spPr>
+        <p:txBody>
+          <a:bodyPr/>
+          <a:lstStyle/>
+          <a:p>
+            <a:pPr>
+              <a:lnSpc>
+                <a:spcPts val="1425"/>
+              </a:lnSpc>
+              <a:buNone/>
+            </a:pPr>
+            <a:r>
+              <a:rPr lang="es-ES" dirty="0"/>
+              <a:t>Es importante nombrar a las cosas correctamente y explicar bien todas las cosas que vas a añadir, ya que de esta</a:t>
+            </a:r>
+          </a:p>
+          <a:p>
+            <a:pPr>
+              <a:lnSpc>
+                <a:spcPts val="1425"/>
+              </a:lnSpc>
+              <a:buNone/>
+            </a:pPr>
+            <a:r>
+              <a:rPr lang="es-ES" dirty="0"/>
+              <a:t>manera se puede saber bien qué cosas se han modificado, añadido y/o quitado</a:t>
+            </a:r>
+          </a:p>
+          <a:p>
+            <a:endParaRPr lang="es-ES" dirty="0"/>
+          </a:p>
+        </p:txBody>
+      </p:sp>
+      <p:sp>
+        <p:nvSpPr>
+          <p:cNvPr id="4" name="CuadroTexto 3">
+            <a:extLst>
+              <a:ext uri="{FF2B5EF4-FFF2-40B4-BE49-F238E27FC236}">
+                <a16:creationId xmlns:a16="http://schemas.microsoft.com/office/drawing/2014/main" id="{3BFAA216-0649-D233-C63B-FAF307E2F198}"/>
+              </a:ext>
+            </a:extLst>
+          </p:cNvPr>
+          <p:cNvSpPr txBox="1"/>
+          <p:nvPr/>
+        </p:nvSpPr>
+        <p:spPr>
+          <a:xfrm>
+            <a:off x="581192" y="3535680"/>
+            <a:ext cx="11029615" cy="2585323"/>
+          </a:xfrm>
+          <a:prstGeom prst="rect">
+            <a:avLst/>
+          </a:prstGeom>
+          <a:noFill/>
+        </p:spPr>
+        <p:txBody>
+          <a:bodyPr wrap="square" rtlCol="0">
+            <a:spAutoFit/>
+          </a:bodyPr>
+          <a:lstStyle/>
+          <a:p>
+            <a:pPr>
+              <a:buNone/>
+            </a:pPr>
+            <a:r>
+              <a:rPr lang="es-ES" dirty="0">
+                <a:solidFill>
+                  <a:schemeClr val="bg1"/>
+                </a:solidFill>
+              </a:rPr>
+              <a:t>Algunos mensajes genéricos que se pueden poner son los siguientes:</a:t>
+            </a:r>
+          </a:p>
+          <a:p>
+            <a:pPr>
+              <a:buNone/>
+            </a:pPr>
+            <a:r>
+              <a:rPr lang="es-ES" dirty="0">
+                <a:solidFill>
+                  <a:schemeClr val="bg1"/>
+                </a:solidFill>
+              </a:rPr>
+              <a:t>- </a:t>
+            </a:r>
+            <a:r>
+              <a:rPr lang="es-ES" i="1" dirty="0" err="1">
+                <a:solidFill>
+                  <a:schemeClr val="bg1"/>
+                </a:solidFill>
+              </a:rPr>
+              <a:t>feat</a:t>
+            </a:r>
+            <a:r>
+              <a:rPr lang="es-ES" i="1" dirty="0">
+                <a:solidFill>
+                  <a:schemeClr val="bg1"/>
+                </a:solidFill>
+              </a:rPr>
+              <a:t>: </a:t>
+            </a:r>
+            <a:r>
+              <a:rPr lang="es-ES" dirty="0">
+                <a:solidFill>
+                  <a:schemeClr val="bg1"/>
+                </a:solidFill>
+              </a:rPr>
+              <a:t>Añadir una nueva funcionalidad</a:t>
+            </a:r>
+          </a:p>
+          <a:p>
+            <a:pPr>
+              <a:buNone/>
+            </a:pPr>
+            <a:r>
+              <a:rPr lang="es-ES" dirty="0">
+                <a:solidFill>
+                  <a:schemeClr val="bg1"/>
+                </a:solidFill>
+              </a:rPr>
+              <a:t>- </a:t>
+            </a:r>
+            <a:r>
+              <a:rPr lang="es-ES" i="1" dirty="0" err="1">
+                <a:solidFill>
+                  <a:schemeClr val="bg1"/>
+                </a:solidFill>
+              </a:rPr>
+              <a:t>fix</a:t>
+            </a:r>
+            <a:r>
+              <a:rPr lang="es-ES" dirty="0">
+                <a:solidFill>
+                  <a:schemeClr val="bg1"/>
+                </a:solidFill>
+              </a:rPr>
+              <a:t>: corregir un error</a:t>
+            </a:r>
+          </a:p>
+          <a:p>
+            <a:pPr>
+              <a:buNone/>
+            </a:pPr>
+            <a:r>
+              <a:rPr lang="es-ES" dirty="0">
+                <a:solidFill>
+                  <a:schemeClr val="bg1"/>
+                </a:solidFill>
+              </a:rPr>
+              <a:t>- </a:t>
+            </a:r>
+            <a:r>
+              <a:rPr lang="es-ES" i="1" dirty="0" err="1">
+                <a:solidFill>
+                  <a:schemeClr val="bg1"/>
+                </a:solidFill>
+              </a:rPr>
+              <a:t>docs</a:t>
+            </a:r>
+            <a:r>
+              <a:rPr lang="es-ES" dirty="0">
+                <a:solidFill>
+                  <a:schemeClr val="bg1"/>
+                </a:solidFill>
+              </a:rPr>
+              <a:t>: Cambios en la documentación</a:t>
+            </a:r>
+          </a:p>
+          <a:p>
+            <a:pPr>
+              <a:buNone/>
+            </a:pPr>
+            <a:r>
+              <a:rPr lang="es-ES" dirty="0">
+                <a:solidFill>
+                  <a:schemeClr val="bg1"/>
+                </a:solidFill>
+              </a:rPr>
+              <a:t>- </a:t>
+            </a:r>
+            <a:r>
+              <a:rPr lang="es-ES" i="1" dirty="0" err="1">
+                <a:solidFill>
+                  <a:schemeClr val="bg1"/>
+                </a:solidFill>
+              </a:rPr>
+              <a:t>style</a:t>
+            </a:r>
+            <a:r>
+              <a:rPr lang="es-ES" dirty="0">
+                <a:solidFill>
+                  <a:schemeClr val="bg1"/>
+                </a:solidFill>
+              </a:rPr>
+              <a:t>: Cambios de estilo</a:t>
+            </a:r>
+          </a:p>
+          <a:p>
+            <a:pPr>
+              <a:buNone/>
+            </a:pPr>
+            <a:r>
+              <a:rPr lang="es-ES" dirty="0">
+                <a:solidFill>
+                  <a:schemeClr val="bg1"/>
+                </a:solidFill>
+              </a:rPr>
+              <a:t>- </a:t>
+            </a:r>
+            <a:r>
+              <a:rPr lang="es-ES" i="1" dirty="0" err="1">
+                <a:solidFill>
+                  <a:schemeClr val="bg1"/>
+                </a:solidFill>
+              </a:rPr>
+              <a:t>refactor</a:t>
+            </a:r>
+            <a:r>
+              <a:rPr lang="es-ES" dirty="0">
+                <a:solidFill>
+                  <a:schemeClr val="bg1"/>
+                </a:solidFill>
+              </a:rPr>
+              <a:t>: Reestructuración del código sin cambiar su comportamiento  </a:t>
+            </a:r>
+          </a:p>
+          <a:p>
+            <a:pPr>
+              <a:buNone/>
+            </a:pPr>
+            <a:r>
+              <a:rPr lang="es-ES" dirty="0">
+                <a:solidFill>
+                  <a:schemeClr val="bg1"/>
+                </a:solidFill>
+              </a:rPr>
+              <a:t>- </a:t>
+            </a:r>
+            <a:r>
+              <a:rPr lang="es-ES" i="1" dirty="0">
+                <a:solidFill>
+                  <a:schemeClr val="bg1"/>
+                </a:solidFill>
+              </a:rPr>
+              <a:t>test: </a:t>
+            </a:r>
+            <a:r>
+              <a:rPr lang="es-ES" dirty="0">
+                <a:solidFill>
+                  <a:schemeClr val="bg1"/>
+                </a:solidFill>
+              </a:rPr>
+              <a:t>Añadir o modificar </a:t>
+            </a:r>
+            <a:r>
+              <a:rPr lang="es-ES" dirty="0" err="1">
+                <a:solidFill>
+                  <a:schemeClr val="bg1"/>
+                </a:solidFill>
+              </a:rPr>
+              <a:t>tests</a:t>
+            </a:r>
+            <a:r>
+              <a:rPr lang="es-ES" dirty="0">
+                <a:solidFill>
+                  <a:schemeClr val="bg1"/>
+                </a:solidFill>
+              </a:rPr>
+              <a:t> </a:t>
+            </a:r>
+          </a:p>
+          <a:p>
+            <a:r>
+              <a:rPr lang="es-ES" dirty="0">
+                <a:solidFill>
+                  <a:schemeClr val="bg1"/>
+                </a:solidFill>
+              </a:rPr>
+              <a:t>- </a:t>
+            </a:r>
+            <a:r>
+              <a:rPr lang="es-ES" i="1" dirty="0">
+                <a:solidFill>
+                  <a:schemeClr val="bg1"/>
+                </a:solidFill>
+              </a:rPr>
+              <a:t>chore</a:t>
+            </a:r>
+            <a:r>
+              <a:rPr lang="es-ES" dirty="0">
+                <a:solidFill>
+                  <a:schemeClr val="bg1"/>
+                </a:solidFill>
+              </a:rPr>
+              <a:t>: Tareas menores que no afectan directamente el código (actualizar dependencias, configuración, etc.)</a:t>
+            </a:r>
+          </a:p>
+          <a:p>
+            <a:endParaRPr lang="es-ES" dirty="0"/>
+          </a:p>
+        </p:txBody>
+      </p:sp>
+    </p:spTree>
+    <p:extLst>
+      <p:ext uri="{BB962C8B-B14F-4D97-AF65-F5344CB8AC3E}">
+        <p14:creationId xmlns:p14="http://schemas.microsoft.com/office/powerpoint/2010/main" val="852268302"/>
+      </p:ext>
+    </p:extLst>
+  </p:cSld>
+  <p:clrMapOvr>
+    <a:masterClrMapping/>
+  </p:clrMapOvr>
+</p:sld>
+</file>
+
+<file path=ppt/slides/slide13.xml><?xml version="1.0" encoding="utf-8"?>
+<p:sld xmlns:a="http://schemas.openxmlformats.org/drawingml/2006/main" xmlns:r="http://schemas.openxmlformats.org/officeDocument/2006/relationships" xmlns:p="http://schemas.openxmlformats.org/presentationml/2006/main">
+  <p:cSld>
+    <p:spTree>
+      <p:nvGrpSpPr>
+        <p:cNvPr id="1" name="">
+          <a:extLst>
+            <a:ext uri="{FF2B5EF4-FFF2-40B4-BE49-F238E27FC236}">
+              <a16:creationId xmlns:a16="http://schemas.microsoft.com/office/drawing/2014/main" id="{CDF6B5EC-39A6-E02E-622B-2DB6D2128177}"/>
+            </a:ext>
+          </a:extLst>
+        </p:cNvPr>
+        <p:cNvGrpSpPr/>
+        <p:nvPr/>
+      </p:nvGrpSpPr>
+      <p:grpSpPr>
+        <a:xfrm>
+          <a:off x="0" y="0"/>
+          <a:ext cx="0" cy="0"/>
+          <a:chOff x="0" y="0"/>
+          <a:chExt cx="0" cy="0"/>
+        </a:xfrm>
+      </p:grpSpPr>
+      <p:sp>
+        <p:nvSpPr>
+          <p:cNvPr id="2" name="Título 1">
+            <a:extLst>
+              <a:ext uri="{FF2B5EF4-FFF2-40B4-BE49-F238E27FC236}">
+                <a16:creationId xmlns:a16="http://schemas.microsoft.com/office/drawing/2014/main" id="{486A28E4-159A-06B0-9DB8-DE7F74D7F2E7}"/>
+              </a:ext>
+            </a:extLst>
+          </p:cNvPr>
+          <p:cNvSpPr>
+            <a:spLocks noGrp="1"/>
+          </p:cNvSpPr>
+          <p:nvPr>
+            <p:ph type="title"/>
+          </p:nvPr>
+        </p:nvSpPr>
+        <p:spPr>
+          <a:xfrm>
+            <a:off x="581192" y="1166696"/>
+            <a:ext cx="11029616" cy="1013800"/>
+          </a:xfrm>
+        </p:spPr>
+        <p:txBody>
+          <a:bodyPr/>
+          <a:lstStyle/>
+          <a:p>
+            <a:r>
+              <a:rPr lang="es-ES" dirty="0"/>
+              <a:t>Convenciones de </a:t>
+            </a:r>
+            <a:r>
+              <a:rPr lang="es-ES" dirty="0" err="1"/>
+              <a:t>Commits</a:t>
+            </a:r>
+            <a:r>
+              <a:rPr lang="es-ES" dirty="0"/>
+              <a:t> y Nombres de Ramas</a:t>
+            </a:r>
+            <a:br>
+              <a:rPr lang="es-ES" b="0" dirty="0">
+                <a:solidFill>
+                  <a:srgbClr val="3B3B3B"/>
+                </a:solidFill>
+                <a:effectLst/>
+                <a:latin typeface="Consolas" panose="020B0609020204030204" pitchFamily="49" charset="0"/>
+              </a:rPr>
+            </a:br>
+            <a:endParaRPr lang="es-ES" dirty="0"/>
+          </a:p>
+        </p:txBody>
+      </p:sp>
+      <p:sp>
+        <p:nvSpPr>
+          <p:cNvPr id="3" name="Marcador de contenido 2">
+            <a:extLst>
+              <a:ext uri="{FF2B5EF4-FFF2-40B4-BE49-F238E27FC236}">
+                <a16:creationId xmlns:a16="http://schemas.microsoft.com/office/drawing/2014/main" id="{BC7FAC98-1BD1-75CA-4A50-5856C184429B}"/>
+              </a:ext>
+            </a:extLst>
+          </p:cNvPr>
+          <p:cNvSpPr>
+            <a:spLocks noGrp="1"/>
+          </p:cNvSpPr>
+          <p:nvPr>
+            <p:ph idx="1"/>
+          </p:nvPr>
+        </p:nvSpPr>
+        <p:spPr>
+          <a:xfrm>
+            <a:off x="581192" y="1946817"/>
+            <a:ext cx="11029615" cy="2730688"/>
+          </a:xfrm>
+        </p:spPr>
+        <p:txBody>
+          <a:bodyPr>
+            <a:normAutofit/>
+          </a:bodyPr>
+          <a:lstStyle/>
+          <a:p>
+            <a:pPr marL="0" indent="0">
+              <a:buNone/>
+            </a:pPr>
+            <a:r>
+              <a:rPr lang="es-ES" dirty="0"/>
+              <a:t>Recomendaciones Generales:</a:t>
+            </a:r>
+          </a:p>
+          <a:p>
+            <a:pPr marL="0" indent="0">
+              <a:buNone/>
+            </a:pPr>
+            <a:r>
+              <a:rPr lang="es-ES" dirty="0"/>
+              <a:t>	Escribir los mensajes de </a:t>
+            </a:r>
+            <a:r>
+              <a:rPr lang="es-ES" dirty="0" err="1"/>
+              <a:t>commit</a:t>
+            </a:r>
+            <a:r>
+              <a:rPr lang="es-ES" dirty="0"/>
+              <a:t> en modo infinitivo</a:t>
+            </a:r>
+          </a:p>
+          <a:p>
+            <a:pPr marL="0" indent="0">
+              <a:buNone/>
+            </a:pPr>
+            <a:r>
+              <a:rPr lang="es-ES" dirty="0"/>
+              <a:t>	Limitar la descripción a máximo 72 caracteres</a:t>
+            </a:r>
+          </a:p>
+          <a:p>
+            <a:pPr marL="0" indent="0">
+              <a:buNone/>
+            </a:pPr>
+            <a:r>
+              <a:rPr lang="es-ES" dirty="0"/>
+              <a:t>	Utilizar el cuerpo del </a:t>
+            </a:r>
+            <a:r>
+              <a:rPr lang="es-ES" dirty="0" err="1"/>
+              <a:t>commit</a:t>
+            </a:r>
+            <a:r>
+              <a:rPr lang="es-ES" dirty="0"/>
+              <a:t> (si es necesario) para explicar el "por qué" del cambio.</a:t>
+            </a:r>
+          </a:p>
+          <a:p>
+            <a:pPr marL="0" indent="0">
+              <a:buNone/>
+            </a:pPr>
+            <a:r>
+              <a:rPr lang="es-ES" dirty="0"/>
+              <a:t>	Evitar mensajes genéricos como </a:t>
+            </a:r>
+            <a:r>
+              <a:rPr lang="es-ES" i="1" dirty="0" err="1"/>
+              <a:t>update</a:t>
+            </a:r>
+            <a:r>
+              <a:rPr lang="es-ES" i="1" dirty="0"/>
+              <a:t>,  cambiar,  eliminar,  agregar,  cosas.</a:t>
+            </a:r>
+          </a:p>
+          <a:p>
+            <a:endParaRPr lang="es-ES" dirty="0"/>
+          </a:p>
+        </p:txBody>
+      </p:sp>
+      <p:pic>
+        <p:nvPicPr>
+          <p:cNvPr id="9220" name="Picture 4" descr="GitHub - Erfaniaa/text-to-commit-history: Write a large text on your GitHub  profile, with your commits history (contribution graph).">
+            <a:extLst>
+              <a:ext uri="{FF2B5EF4-FFF2-40B4-BE49-F238E27FC236}">
+                <a16:creationId xmlns:a16="http://schemas.microsoft.com/office/drawing/2014/main" id="{0D749DDE-8B39-CB03-C1A9-4218065E4B9A}"/>
+              </a:ext>
+            </a:extLst>
+          </p:cNvPr>
+          <p:cNvPicPr>
+            <a:picLocks noChangeAspect="1" noChangeArrowheads="1"/>
+          </p:cNvPicPr>
+          <p:nvPr/>
+        </p:nvPicPr>
+        <p:blipFill>
+          <a:blip r:embed="rId2">
+            <a:extLst>
+              <a:ext uri="{28A0092B-C50C-407E-A947-70E740481C1C}">
+                <a14:useLocalDpi xmlns:a14="http://schemas.microsoft.com/office/drawing/2010/main" val="0"/>
+              </a:ext>
+            </a:extLst>
+          </a:blip>
+          <a:srcRect/>
+          <a:stretch>
+            <a:fillRect/>
+          </a:stretch>
+        </p:blipFill>
+        <p:spPr bwMode="auto">
+          <a:xfrm>
+            <a:off x="852169" y="4559934"/>
+            <a:ext cx="10034049" cy="1891665"/>
+          </a:xfrm>
+          <a:prstGeom prst="rect">
+            <a:avLst/>
+          </a:prstGeom>
+          <a:noFill/>
+          <a:extLst>
+            <a:ext uri="{909E8E84-426E-40DD-AFC4-6F175D3DCCD1}">
+              <a14:hiddenFill xmlns:a14="http://schemas.microsoft.com/office/drawing/2010/main">
+                <a:solidFill>
+                  <a:srgbClr val="FFFFFF"/>
+                </a:solidFill>
+              </a14:hiddenFill>
+            </a:ext>
+          </a:extLst>
+        </p:spPr>
+      </p:pic>
+    </p:spTree>
+    <p:extLst>
+      <p:ext uri="{BB962C8B-B14F-4D97-AF65-F5344CB8AC3E}">
+        <p14:creationId xmlns:p14="http://schemas.microsoft.com/office/powerpoint/2010/main" val="213761850"/>
+      </p:ext>
+    </p:extLst>
+  </p:cSld>
+  <p:clrMapOvr>
+    <a:masterClrMapping/>
+  </p:clrMapOvr>
+</p:sld>
+</file>
+
+<file path=ppt/slides/slide14.xml><?xml version="1.0" encoding="utf-8"?>
+<p:sld xmlns:a="http://schemas.openxmlformats.org/drawingml/2006/main" xmlns:r="http://schemas.openxmlformats.org/officeDocument/2006/relationships" xmlns:p="http://schemas.openxmlformats.org/presentationml/2006/main">
+  <p:cSld>
+    <p:spTree>
+      <p:nvGrpSpPr>
+        <p:cNvPr id="1" name=""/>
+        <p:cNvGrpSpPr/>
+        <p:nvPr/>
+      </p:nvGrpSpPr>
+      <p:grpSpPr>
+        <a:xfrm>
+          <a:off x="0" y="0"/>
+          <a:ext cx="0" cy="0"/>
+          <a:chOff x="0" y="0"/>
+          <a:chExt cx="0" cy="0"/>
+        </a:xfrm>
+      </p:grpSpPr>
+      <p:sp>
+        <p:nvSpPr>
+          <p:cNvPr id="2" name="Título 1">
+            <a:extLst>
+              <a:ext uri="{FF2B5EF4-FFF2-40B4-BE49-F238E27FC236}">
+                <a16:creationId xmlns:a16="http://schemas.microsoft.com/office/drawing/2014/main" id="{26F8B048-CA84-386D-1B5D-9744FE161676}"/>
+              </a:ext>
+            </a:extLst>
+          </p:cNvPr>
+          <p:cNvSpPr>
+            <a:spLocks noGrp="1"/>
+          </p:cNvSpPr>
+          <p:nvPr>
+            <p:ph type="title"/>
+          </p:nvPr>
+        </p:nvSpPr>
+        <p:spPr/>
+        <p:txBody>
+          <a:bodyPr/>
+          <a:lstStyle/>
+          <a:p>
+            <a:r>
+              <a:rPr lang="es-ES" dirty="0"/>
+              <a:t>Git </a:t>
+            </a:r>
+            <a:r>
+              <a:rPr lang="es-ES" dirty="0" err="1"/>
+              <a:t>hub</a:t>
+            </a:r>
+            <a:r>
+              <a:rPr lang="es-ES" dirty="0"/>
+              <a:t> </a:t>
+            </a:r>
+            <a:r>
+              <a:rPr lang="es-ES" dirty="0" err="1"/>
+              <a:t>actions</a:t>
+            </a:r>
+            <a:endParaRPr lang="es-ES" dirty="0"/>
+          </a:p>
+        </p:txBody>
+      </p:sp>
+      <p:sp>
+        <p:nvSpPr>
+          <p:cNvPr id="3" name="Marcador de contenido 2">
+            <a:extLst>
+              <a:ext uri="{FF2B5EF4-FFF2-40B4-BE49-F238E27FC236}">
+                <a16:creationId xmlns:a16="http://schemas.microsoft.com/office/drawing/2014/main" id="{D68D3B6D-C37F-0325-9202-AF469917E76F}"/>
+              </a:ext>
+            </a:extLst>
+          </p:cNvPr>
+          <p:cNvSpPr>
+            <a:spLocks noGrp="1"/>
+          </p:cNvSpPr>
+          <p:nvPr>
+            <p:ph idx="1"/>
+          </p:nvPr>
+        </p:nvSpPr>
+        <p:spPr>
+          <a:xfrm>
+            <a:off x="581192" y="2180497"/>
+            <a:ext cx="11029615" cy="1700623"/>
+          </a:xfrm>
+        </p:spPr>
+        <p:txBody>
+          <a:bodyPr/>
+          <a:lstStyle/>
+          <a:p>
+            <a:r>
+              <a:rPr lang="es-ES" dirty="0"/>
+              <a:t>GitHub </a:t>
+            </a:r>
+            <a:r>
+              <a:rPr lang="es-ES" dirty="0" err="1"/>
+              <a:t>Actions</a:t>
+            </a:r>
+            <a:r>
+              <a:rPr lang="es-ES" dirty="0"/>
+              <a:t> es una funcionalidad que permite automatizar tareas dentro de un repositorio de GitHub. Esto significa que puedes configurar procesos automáticos que se ejecuten en respuesta a eventos, como cuando alguien hace un </a:t>
+            </a:r>
+            <a:r>
+              <a:rPr lang="es-ES" dirty="0" err="1"/>
+              <a:t>commit</a:t>
+            </a:r>
+            <a:r>
+              <a:rPr lang="es-ES" dirty="0"/>
+              <a:t> o crea un </a:t>
+            </a:r>
+            <a:r>
+              <a:rPr lang="es-ES" dirty="0" err="1"/>
+              <a:t>pull</a:t>
+            </a:r>
+            <a:r>
+              <a:rPr lang="es-ES" dirty="0"/>
+              <a:t> </a:t>
+            </a:r>
+            <a:r>
+              <a:rPr lang="es-ES" dirty="0" err="1"/>
+              <a:t>request</a:t>
+            </a:r>
+            <a:r>
+              <a:rPr lang="es-ES" dirty="0"/>
+              <a:t>.</a:t>
+            </a:r>
+          </a:p>
+          <a:p>
+            <a:endParaRPr lang="es-ES" dirty="0"/>
+          </a:p>
+        </p:txBody>
+      </p:sp>
+      <p:pic>
+        <p:nvPicPr>
+          <p:cNvPr id="10242" name="Picture 2">
+            <a:extLst>
+              <a:ext uri="{FF2B5EF4-FFF2-40B4-BE49-F238E27FC236}">
+                <a16:creationId xmlns:a16="http://schemas.microsoft.com/office/drawing/2014/main" id="{69E08C35-E4ED-FA90-E2D4-445080E7B588}"/>
+              </a:ext>
+            </a:extLst>
+          </p:cNvPr>
+          <p:cNvPicPr>
+            <a:picLocks noChangeAspect="1" noChangeArrowheads="1"/>
+          </p:cNvPicPr>
+          <p:nvPr/>
+        </p:nvPicPr>
+        <p:blipFill>
+          <a:blip r:embed="rId2">
+            <a:extLst>
+              <a:ext uri="{28A0092B-C50C-407E-A947-70E740481C1C}">
+                <a14:useLocalDpi xmlns:a14="http://schemas.microsoft.com/office/drawing/2010/main" val="0"/>
+              </a:ext>
+            </a:extLst>
+          </a:blip>
+          <a:srcRect/>
+          <a:stretch>
+            <a:fillRect/>
+          </a:stretch>
+        </p:blipFill>
+        <p:spPr bwMode="auto">
+          <a:xfrm>
+            <a:off x="6543040" y="3724429"/>
+            <a:ext cx="4621848" cy="2431415"/>
+          </a:xfrm>
+          <a:prstGeom prst="rect">
+            <a:avLst/>
+          </a:prstGeom>
+          <a:noFill/>
+          <a:extLst>
+            <a:ext uri="{909E8E84-426E-40DD-AFC4-6F175D3DCCD1}">
+              <a14:hiddenFill xmlns:a14="http://schemas.microsoft.com/office/drawing/2010/main">
+                <a:solidFill>
+                  <a:srgbClr val="FFFFFF"/>
+                </a:solidFill>
+              </a14:hiddenFill>
+            </a:ext>
+          </a:extLst>
+        </p:spPr>
+      </p:pic>
+    </p:spTree>
+    <p:extLst>
+      <p:ext uri="{BB962C8B-B14F-4D97-AF65-F5344CB8AC3E}">
+        <p14:creationId xmlns:p14="http://schemas.microsoft.com/office/powerpoint/2010/main" val="509439090"/>
+      </p:ext>
+    </p:extLst>
+  </p:cSld>
+  <p:clrMapOvr>
+    <a:masterClrMapping/>
+  </p:clrMapOvr>
+</p:sld>
+</file>
+
+<file path=ppt/slides/slide15.xml><?xml version="1.0" encoding="utf-8"?>
+<p:sld xmlns:a="http://schemas.openxmlformats.org/drawingml/2006/main" xmlns:r="http://schemas.openxmlformats.org/officeDocument/2006/relationships" xmlns:p="http://schemas.openxmlformats.org/presentationml/2006/main">
+  <p:cSld>
+    <p:spTree>
+      <p:nvGrpSpPr>
+        <p:cNvPr id="1" name=""/>
+        <p:cNvGrpSpPr/>
+        <p:nvPr/>
+      </p:nvGrpSpPr>
+      <p:grpSpPr>
+        <a:xfrm>
+          <a:off x="0" y="0"/>
+          <a:ext cx="0" cy="0"/>
+          <a:chOff x="0" y="0"/>
+          <a:chExt cx="0" cy="0"/>
+        </a:xfrm>
+      </p:grpSpPr>
+      <p:sp>
+        <p:nvSpPr>
+          <p:cNvPr id="2" name="Título 1">
+            <a:extLst>
+              <a:ext uri="{FF2B5EF4-FFF2-40B4-BE49-F238E27FC236}">
+                <a16:creationId xmlns:a16="http://schemas.microsoft.com/office/drawing/2014/main" id="{D187955D-F975-9993-F012-33A5FE555FBB}"/>
+              </a:ext>
+            </a:extLst>
+          </p:cNvPr>
+          <p:cNvSpPr>
+            <a:spLocks noGrp="1"/>
+          </p:cNvSpPr>
+          <p:nvPr>
+            <p:ph type="title"/>
+          </p:nvPr>
+        </p:nvSpPr>
+        <p:spPr/>
+        <p:txBody>
+          <a:bodyPr/>
+          <a:lstStyle/>
+          <a:p>
+            <a:r>
+              <a:rPr lang="es-ES" dirty="0"/>
+              <a:t>CI/CD</a:t>
+            </a:r>
+          </a:p>
+        </p:txBody>
+      </p:sp>
+      <p:sp>
+        <p:nvSpPr>
+          <p:cNvPr id="4" name="Rectangle 1">
+            <a:extLst>
+              <a:ext uri="{FF2B5EF4-FFF2-40B4-BE49-F238E27FC236}">
+                <a16:creationId xmlns:a16="http://schemas.microsoft.com/office/drawing/2014/main" id="{503DB7B9-C28D-D4F5-8E06-0C8912158650}"/>
+              </a:ext>
+            </a:extLst>
+          </p:cNvPr>
+          <p:cNvSpPr>
+            <a:spLocks noGrp="1" noChangeArrowheads="1"/>
+          </p:cNvSpPr>
+          <p:nvPr>
+            <p:ph idx="1"/>
+          </p:nvPr>
+        </p:nvSpPr>
+        <p:spPr bwMode="auto">
+          <a:xfrm>
+            <a:off x="432836" y="2278884"/>
+            <a:ext cx="11326328" cy="1754326"/>
+          </a:xfrm>
+          <a:prstGeom prst="rect">
+            <a:avLst/>
+          </a:prstGeom>
+          <a:noFill/>
+          <a:ln>
+            <a:noFill/>
+          </a:ln>
+          <a:effectLst/>
+          <a:extLst>
+            <a:ext uri="{909E8E84-426E-40DD-AFC4-6F175D3DCCD1}">
+              <a14:hiddenFill xmlns:a14="http://schemas.microsoft.com/office/drawing/2010/main">
+                <a:solidFill>
+                  <a:schemeClr val="accent1"/>
+                </a:solidFill>
+              </a14:hiddenFill>
+            </a:ext>
+            <a:ext uri="{91240B29-F687-4F45-9708-019B960494DF}">
+              <a14:hiddenLine xmlns:a14="http://schemas.microsoft.com/office/drawing/2010/main" w="9525">
+                <a:solidFill>
+                  <a:schemeClr val="tx1"/>
+                </a:solidFill>
+                <a:miter lim="800000"/>
+                <a:headEnd/>
+                <a:tailEnd/>
+              </a14:hiddenLine>
+            </a:ext>
+            <a:ext uri="{AF507438-7753-43E0-B8FC-AC1667EBCBE1}">
+              <a14:hiddenEffects xmlns:a14="http://schemas.microsoft.com/office/drawing/2010/main">
+                <a:effectLst>
+                  <a:outerShdw dist="35921" dir="2700000" algn="ctr" rotWithShape="0">
+                    <a:schemeClr val="bg2"/>
+                  </a:outerShdw>
+                </a:effectLst>
+              </a14:hiddenEffects>
+            </a:ext>
+          </a:extLst>
+        </p:spPr>
+        <p:txBody>
+          <a:bodyPr vert="horz" wrap="square" lIns="91440" tIns="45720" rIns="91440" bIns="45720" numCol="1" anchor="ctr" anchorCtr="0" compatLnSpc="1">
+            <a:prstTxWarp prst="textNoShape">
+              <a:avLst/>
+            </a:prstTxWarp>
+            <a:spAutoFit/>
+          </a:bodyPr>
+          <a:lstStyle/>
+          <a:p>
+            <a:pPr marL="0" marR="0" lvl="0" indent="0" algn="l" defTabSz="914400" rtl="0" eaLnBrk="0" fontAlgn="base" latinLnBrk="0" hangingPunct="0">
+              <a:lnSpc>
+                <a:spcPct val="100000"/>
+              </a:lnSpc>
+              <a:spcBef>
+                <a:spcPct val="0"/>
+              </a:spcBef>
+              <a:spcAft>
+                <a:spcPct val="0"/>
+              </a:spcAft>
+              <a:buClrTx/>
+              <a:buSzTx/>
+              <a:buFontTx/>
+              <a:buNone/>
+              <a:tabLst/>
+            </a:pPr>
+            <a:r>
+              <a:rPr kumimoji="0" lang="es-ES" altLang="es-ES" sz="1800" b="0" i="0" u="none" strike="noStrike" cap="none" normalizeH="0" baseline="0" dirty="0">
+                <a:ln>
+                  <a:noFill/>
+                </a:ln>
+                <a:solidFill>
+                  <a:schemeClr val="tx1"/>
+                </a:solidFill>
+                <a:effectLst/>
+                <a:latin typeface="Arial" panose="020B0604020202020204" pitchFamily="34" charset="0"/>
+              </a:rPr>
+              <a:t>CI/CD es una práctica de desarrollo que automatiza la integración y entrega del código:</a:t>
+            </a:r>
+          </a:p>
+          <a:p>
+            <a:pPr marL="0" marR="0" lvl="0" indent="0" algn="l" defTabSz="914400" rtl="0" eaLnBrk="0" fontAlgn="base" latinLnBrk="0" hangingPunct="0">
+              <a:lnSpc>
+                <a:spcPct val="100000"/>
+              </a:lnSpc>
+              <a:spcBef>
+                <a:spcPct val="0"/>
+              </a:spcBef>
+              <a:spcAft>
+                <a:spcPct val="0"/>
+              </a:spcAft>
+              <a:buClrTx/>
+              <a:buSzTx/>
+              <a:buFontTx/>
+              <a:buNone/>
+              <a:tabLst/>
+            </a:pPr>
+            <a:br>
+              <a:rPr kumimoji="0" lang="es-ES" altLang="es-ES" sz="1800" b="0" i="0" u="none" strike="noStrike" cap="none" normalizeH="0" baseline="0" dirty="0">
+                <a:ln>
+                  <a:noFill/>
+                </a:ln>
+                <a:solidFill>
+                  <a:schemeClr val="tx1"/>
+                </a:solidFill>
+                <a:effectLst/>
+                <a:latin typeface="Arial" panose="020B0604020202020204" pitchFamily="34" charset="0"/>
+              </a:rPr>
+            </a:br>
+            <a:r>
+              <a:rPr kumimoji="0" lang="es-ES" altLang="es-ES" sz="1800" b="0" i="0" u="none" strike="noStrike" cap="none" normalizeH="0" baseline="0" dirty="0">
+                <a:ln>
+                  <a:noFill/>
+                </a:ln>
+                <a:solidFill>
+                  <a:schemeClr val="tx1"/>
+                </a:solidFill>
+                <a:effectLst/>
+                <a:latin typeface="Arial" panose="020B0604020202020204" pitchFamily="34" charset="0"/>
+              </a:rPr>
+              <a:t>- </a:t>
+            </a:r>
+            <a:r>
+              <a:rPr kumimoji="0" lang="es-ES" altLang="es-ES" sz="1800" b="1" i="0" u="none" strike="noStrike" cap="none" normalizeH="0" baseline="0" dirty="0">
+                <a:ln>
+                  <a:noFill/>
+                </a:ln>
+                <a:solidFill>
+                  <a:schemeClr val="tx1"/>
+                </a:solidFill>
+                <a:effectLst/>
+                <a:latin typeface="Arial" panose="020B0604020202020204" pitchFamily="34" charset="0"/>
+              </a:rPr>
+              <a:t>CI (Integración Continua):</a:t>
+            </a:r>
+            <a:r>
+              <a:rPr kumimoji="0" lang="es-ES" altLang="es-ES" sz="1800" b="0" i="0" u="none" strike="noStrike" cap="none" normalizeH="0" baseline="0" dirty="0">
+                <a:ln>
+                  <a:noFill/>
+                </a:ln>
+                <a:solidFill>
+                  <a:schemeClr val="tx1"/>
+                </a:solidFill>
+                <a:effectLst/>
+                <a:latin typeface="Arial" panose="020B0604020202020204" pitchFamily="34" charset="0"/>
+              </a:rPr>
+              <a:t> verifica automáticamente los cambios mediante pruebas cada vez que se sube código.</a:t>
+            </a:r>
+            <a:br>
+              <a:rPr kumimoji="0" lang="es-ES" altLang="es-ES" sz="1800" b="0" i="0" u="none" strike="noStrike" cap="none" normalizeH="0" baseline="0" dirty="0">
+                <a:ln>
+                  <a:noFill/>
+                </a:ln>
+                <a:solidFill>
+                  <a:schemeClr val="tx1"/>
+                </a:solidFill>
+                <a:effectLst/>
+                <a:latin typeface="Arial" panose="020B0604020202020204" pitchFamily="34" charset="0"/>
+              </a:rPr>
+            </a:br>
+            <a:r>
+              <a:rPr kumimoji="0" lang="es-ES" altLang="es-ES" sz="1800" b="0" i="0" u="none" strike="noStrike" cap="none" normalizeH="0" baseline="0" dirty="0">
+                <a:ln>
+                  <a:noFill/>
+                </a:ln>
+                <a:solidFill>
+                  <a:schemeClr val="tx1"/>
+                </a:solidFill>
+                <a:effectLst/>
+                <a:latin typeface="Arial" panose="020B0604020202020204" pitchFamily="34" charset="0"/>
+              </a:rPr>
+              <a:t>- </a:t>
+            </a:r>
+            <a:r>
+              <a:rPr kumimoji="0" lang="es-ES" altLang="es-ES" sz="1800" b="1" i="0" u="none" strike="noStrike" cap="none" normalizeH="0" baseline="0" dirty="0">
+                <a:ln>
+                  <a:noFill/>
+                </a:ln>
+                <a:solidFill>
+                  <a:schemeClr val="tx1"/>
+                </a:solidFill>
+                <a:effectLst/>
+                <a:latin typeface="Arial" panose="020B0604020202020204" pitchFamily="34" charset="0"/>
+              </a:rPr>
+              <a:t>CD (Entrega/Despliegue Continuo)</a:t>
+            </a:r>
+            <a:r>
+              <a:rPr kumimoji="0" lang="es-ES" altLang="es-ES" sz="1800" b="0" i="0" u="none" strike="noStrike" cap="none" normalizeH="0" baseline="0" dirty="0">
+                <a:ln>
+                  <a:noFill/>
+                </a:ln>
+                <a:solidFill>
+                  <a:schemeClr val="tx1"/>
+                </a:solidFill>
+                <a:effectLst/>
+                <a:latin typeface="Arial" panose="020B0604020202020204" pitchFamily="34" charset="0"/>
+              </a:rPr>
+              <a:t> automatiza el proceso de llevar ese código a producción o entornos de prueba de forma segura y rápida.</a:t>
+            </a:r>
+          </a:p>
+        </p:txBody>
+      </p:sp>
+      <p:pic>
+        <p:nvPicPr>
+          <p:cNvPr id="11267" name="Picture 3" descr="Advanced CI/CD Pipeline in Node.js with GitHub Actions and Slack | by  Prakhar Prakash Bhardwaj | GoGroup Tech Blog">
+            <a:extLst>
+              <a:ext uri="{FF2B5EF4-FFF2-40B4-BE49-F238E27FC236}">
+                <a16:creationId xmlns:a16="http://schemas.microsoft.com/office/drawing/2014/main" id="{ED189261-C0A0-254D-C0BA-23ED8F912CBD}"/>
+              </a:ext>
+            </a:extLst>
+          </p:cNvPr>
+          <p:cNvPicPr>
+            <a:picLocks noChangeAspect="1" noChangeArrowheads="1"/>
+          </p:cNvPicPr>
+          <p:nvPr/>
+        </p:nvPicPr>
+        <p:blipFill>
+          <a:blip r:embed="rId2">
+            <a:extLst>
+              <a:ext uri="{28A0092B-C50C-407E-A947-70E740481C1C}">
+                <a14:useLocalDpi xmlns:a14="http://schemas.microsoft.com/office/drawing/2010/main" val="0"/>
+              </a:ext>
+            </a:extLst>
+          </a:blip>
+          <a:srcRect/>
+          <a:stretch>
+            <a:fillRect/>
+          </a:stretch>
+        </p:blipFill>
+        <p:spPr bwMode="auto">
+          <a:xfrm>
+            <a:off x="2390140" y="3794777"/>
+            <a:ext cx="7635240" cy="2941303"/>
+          </a:xfrm>
+          <a:prstGeom prst="rect">
+            <a:avLst/>
+          </a:prstGeom>
+          <a:noFill/>
+          <a:extLst>
+            <a:ext uri="{909E8E84-426E-40DD-AFC4-6F175D3DCCD1}">
+              <a14:hiddenFill xmlns:a14="http://schemas.microsoft.com/office/drawing/2010/main">
+                <a:solidFill>
+                  <a:srgbClr val="FFFFFF"/>
+                </a:solidFill>
+              </a14:hiddenFill>
+            </a:ext>
+          </a:extLst>
+        </p:spPr>
+      </p:pic>
+    </p:spTree>
+    <p:extLst>
+      <p:ext uri="{BB962C8B-B14F-4D97-AF65-F5344CB8AC3E}">
+        <p14:creationId xmlns:p14="http://schemas.microsoft.com/office/powerpoint/2010/main" val="2061094387"/>
+      </p:ext>
+    </p:extLst>
+  </p:cSld>
+  <p:clrMapOvr>
+    <a:masterClrMapping/>
+  </p:clrMapOvr>
+</p:sld>
+</file>
+
 <file path=ppt/slides/slide2.xml><?xml version="1.0" encoding="utf-8"?>
 <p:sld xmlns:a="http://schemas.openxmlformats.org/drawingml/2006/main" xmlns:r="http://schemas.openxmlformats.org/officeDocument/2006/relationships" xmlns:p="http://schemas.openxmlformats.org/presentationml/2006/main">
   <p:cSld>
@@ -6703,6 +8224,674 @@
     <p:extLst>
       <p:ext uri="{BB962C8B-B14F-4D97-AF65-F5344CB8AC3E}">
         <p14:creationId xmlns:p14="http://schemas.microsoft.com/office/powerpoint/2010/main" val="1043762986"/>
+      </p:ext>
+    </p:extLst>
+  </p:cSld>
+  <p:clrMapOvr>
+    <a:masterClrMapping/>
+  </p:clrMapOvr>
+</p:sld>
+</file>
+
+<file path=ppt/slides/slide8.xml><?xml version="1.0" encoding="utf-8"?>
+<p:sld xmlns:a="http://schemas.openxmlformats.org/drawingml/2006/main" xmlns:r="http://schemas.openxmlformats.org/officeDocument/2006/relationships" xmlns:p="http://schemas.openxmlformats.org/presentationml/2006/main">
+  <p:cSld>
+    <p:spTree>
+      <p:nvGrpSpPr>
+        <p:cNvPr id="1" name=""/>
+        <p:cNvGrpSpPr/>
+        <p:nvPr/>
+      </p:nvGrpSpPr>
+      <p:grpSpPr>
+        <a:xfrm>
+          <a:off x="0" y="0"/>
+          <a:ext cx="0" cy="0"/>
+          <a:chOff x="0" y="0"/>
+          <a:chExt cx="0" cy="0"/>
+        </a:xfrm>
+      </p:grpSpPr>
+      <p:sp>
+        <p:nvSpPr>
+          <p:cNvPr id="2" name="Título 1">
+            <a:extLst>
+              <a:ext uri="{FF2B5EF4-FFF2-40B4-BE49-F238E27FC236}">
+                <a16:creationId xmlns:a16="http://schemas.microsoft.com/office/drawing/2014/main" id="{8C81F85C-E800-AFE8-677A-62A310DD10D0}"/>
+              </a:ext>
+            </a:extLst>
+          </p:cNvPr>
+          <p:cNvSpPr>
+            <a:spLocks noGrp="1"/>
+          </p:cNvSpPr>
+          <p:nvPr>
+            <p:ph type="title"/>
+          </p:nvPr>
+        </p:nvSpPr>
+        <p:spPr/>
+        <p:txBody>
+          <a:bodyPr/>
+          <a:lstStyle/>
+          <a:p>
+            <a:r>
+              <a:rPr lang="es-ES" dirty="0"/>
+              <a:t>Issues</a:t>
+            </a:r>
+          </a:p>
+        </p:txBody>
+      </p:sp>
+      <p:sp>
+        <p:nvSpPr>
+          <p:cNvPr id="3" name="Marcador de contenido 2">
+            <a:extLst>
+              <a:ext uri="{FF2B5EF4-FFF2-40B4-BE49-F238E27FC236}">
+                <a16:creationId xmlns:a16="http://schemas.microsoft.com/office/drawing/2014/main" id="{39D34036-ABB4-D76D-3847-745B7388B215}"/>
+              </a:ext>
+            </a:extLst>
+          </p:cNvPr>
+          <p:cNvSpPr>
+            <a:spLocks noGrp="1"/>
+          </p:cNvSpPr>
+          <p:nvPr>
+            <p:ph idx="1"/>
+          </p:nvPr>
+        </p:nvSpPr>
+        <p:spPr>
+          <a:xfrm>
+            <a:off x="581192" y="2180497"/>
+            <a:ext cx="11029615" cy="1578704"/>
+          </a:xfrm>
+        </p:spPr>
+        <p:txBody>
+          <a:bodyPr/>
+          <a:lstStyle/>
+          <a:p>
+            <a:r>
+              <a:rPr lang="es-ES" dirty="0"/>
+              <a:t>Los Issues son tareas, ideas, errores o mejoras que se registran en un repositorio. Se utilizan para mantener organizado el trabajo dentro de un proyecto colaborativo</a:t>
+            </a:r>
+          </a:p>
+          <a:p>
+            <a:endParaRPr lang="es-ES" dirty="0"/>
+          </a:p>
+        </p:txBody>
+      </p:sp>
+      <p:sp>
+        <p:nvSpPr>
+          <p:cNvPr id="4" name="CuadroTexto 3">
+            <a:extLst>
+              <a:ext uri="{FF2B5EF4-FFF2-40B4-BE49-F238E27FC236}">
+                <a16:creationId xmlns:a16="http://schemas.microsoft.com/office/drawing/2014/main" id="{0C4090FC-EF49-3843-6E4D-6A9E41BDF3FA}"/>
+              </a:ext>
+            </a:extLst>
+          </p:cNvPr>
+          <p:cNvSpPr txBox="1"/>
+          <p:nvPr/>
+        </p:nvSpPr>
+        <p:spPr>
+          <a:xfrm>
+            <a:off x="581192" y="3384829"/>
+            <a:ext cx="3484880" cy="2771015"/>
+          </a:xfrm>
+          <a:prstGeom prst="rect">
+            <a:avLst/>
+          </a:prstGeom>
+          <a:noFill/>
+        </p:spPr>
+        <p:txBody>
+          <a:bodyPr wrap="square" rtlCol="0">
+            <a:spAutoFit/>
+          </a:bodyPr>
+          <a:lstStyle/>
+          <a:p>
+            <a:pPr marL="306000" indent="-306000">
+              <a:lnSpc>
+                <a:spcPts val="1425"/>
+              </a:lnSpc>
+              <a:spcBef>
+                <a:spcPct val="20000"/>
+              </a:spcBef>
+              <a:spcAft>
+                <a:spcPts val="600"/>
+              </a:spcAft>
+              <a:buClr>
+                <a:schemeClr val="accent2"/>
+              </a:buClr>
+              <a:buSzPct val="92000"/>
+              <a:buFont typeface="Wingdings 2" panose="05020102010507070707" pitchFamily="18" charset="2"/>
+              <a:buChar char=""/>
+            </a:pPr>
+            <a:r>
+              <a:rPr lang="es-ES" dirty="0">
+                <a:solidFill>
+                  <a:schemeClr val="tx2"/>
+                </a:solidFill>
+              </a:rPr>
+              <a:t>Cada </a:t>
+            </a:r>
+            <a:r>
+              <a:rPr lang="es-ES" dirty="0" err="1">
+                <a:solidFill>
+                  <a:schemeClr val="tx2"/>
+                </a:solidFill>
+              </a:rPr>
+              <a:t>issue</a:t>
+            </a:r>
+            <a:r>
+              <a:rPr lang="es-ES" dirty="0">
+                <a:solidFill>
+                  <a:schemeClr val="tx2"/>
+                </a:solidFill>
+              </a:rPr>
+              <a:t> se puede:</a:t>
+            </a:r>
+          </a:p>
+          <a:p>
+            <a:pPr>
+              <a:lnSpc>
+                <a:spcPts val="1425"/>
+              </a:lnSpc>
+              <a:spcBef>
+                <a:spcPct val="20000"/>
+              </a:spcBef>
+              <a:spcAft>
+                <a:spcPts val="600"/>
+              </a:spcAft>
+              <a:buClr>
+                <a:schemeClr val="accent2"/>
+              </a:buClr>
+              <a:buSzPct val="92000"/>
+            </a:pPr>
+            <a:br>
+              <a:rPr lang="es-ES" dirty="0">
+                <a:solidFill>
+                  <a:schemeClr val="tx2"/>
+                </a:solidFill>
+              </a:rPr>
+            </a:br>
+            <a:r>
+              <a:rPr lang="es-ES" dirty="0">
+                <a:solidFill>
+                  <a:schemeClr val="tx2"/>
+                </a:solidFill>
+              </a:rPr>
+              <a:t>	- Titular con una tarea clara.</a:t>
+            </a:r>
+          </a:p>
+          <a:p>
+            <a:pPr>
+              <a:lnSpc>
+                <a:spcPts val="1425"/>
+              </a:lnSpc>
+              <a:spcBef>
+                <a:spcPct val="20000"/>
+              </a:spcBef>
+              <a:spcAft>
+                <a:spcPts val="600"/>
+              </a:spcAft>
+              <a:buClr>
+                <a:schemeClr val="accent2"/>
+              </a:buClr>
+              <a:buSzPct val="92000"/>
+            </a:pPr>
+            <a:r>
+              <a:rPr lang="es-ES" dirty="0">
+                <a:solidFill>
+                  <a:schemeClr val="tx2"/>
+                </a:solidFill>
+              </a:rPr>
+              <a:t>	- Describir con más detalle lo 	que se necesita hacer.</a:t>
+            </a:r>
+          </a:p>
+          <a:p>
+            <a:pPr>
+              <a:lnSpc>
+                <a:spcPts val="1425"/>
+              </a:lnSpc>
+              <a:spcBef>
+                <a:spcPct val="20000"/>
+              </a:spcBef>
+              <a:spcAft>
+                <a:spcPts val="600"/>
+              </a:spcAft>
+              <a:buClr>
+                <a:schemeClr val="accent2"/>
+              </a:buClr>
+              <a:buSzPct val="92000"/>
+            </a:pPr>
+            <a:r>
+              <a:rPr lang="es-ES" dirty="0">
+                <a:solidFill>
+                  <a:schemeClr val="tx2"/>
+                </a:solidFill>
+              </a:rPr>
+              <a:t>	- Comentar y discutir con 	otros colaboradores.</a:t>
+            </a:r>
+          </a:p>
+          <a:p>
+            <a:pPr>
+              <a:lnSpc>
+                <a:spcPts val="1425"/>
+              </a:lnSpc>
+              <a:spcBef>
+                <a:spcPct val="20000"/>
+              </a:spcBef>
+              <a:spcAft>
+                <a:spcPts val="600"/>
+              </a:spcAft>
+              <a:buClr>
+                <a:schemeClr val="accent2"/>
+              </a:buClr>
+              <a:buSzPct val="92000"/>
+            </a:pPr>
+            <a:r>
+              <a:rPr lang="es-ES" dirty="0">
+                <a:solidFill>
+                  <a:schemeClr val="tx2"/>
+                </a:solidFill>
+              </a:rPr>
+              <a:t>	- Cerrar automáticamente con 	</a:t>
+            </a:r>
+            <a:r>
+              <a:rPr lang="es-ES" dirty="0" err="1">
+                <a:solidFill>
+                  <a:schemeClr val="tx2"/>
+                </a:solidFill>
+              </a:rPr>
+              <a:t>commits</a:t>
+            </a:r>
+            <a:r>
+              <a:rPr lang="es-ES" dirty="0">
+                <a:solidFill>
+                  <a:schemeClr val="tx2"/>
+                </a:solidFill>
+              </a:rPr>
+              <a:t>.</a:t>
+            </a:r>
+            <a:br>
+              <a:rPr lang="es-ES" dirty="0">
+                <a:solidFill>
+                  <a:schemeClr val="tx2"/>
+                </a:solidFill>
+              </a:rPr>
+            </a:br>
+            <a:endParaRPr lang="es-ES" dirty="0">
+              <a:solidFill>
+                <a:schemeClr val="tx2"/>
+              </a:solidFill>
+            </a:endParaRPr>
+          </a:p>
+          <a:p>
+            <a:endParaRPr lang="es-ES" dirty="0"/>
+          </a:p>
+        </p:txBody>
+      </p:sp>
+      <p:pic>
+        <p:nvPicPr>
+          <p:cNvPr id="6146" name="Picture 2" descr="What's new with GitHub Issues - GitHub Changelog">
+            <a:extLst>
+              <a:ext uri="{FF2B5EF4-FFF2-40B4-BE49-F238E27FC236}">
+                <a16:creationId xmlns:a16="http://schemas.microsoft.com/office/drawing/2014/main" id="{CD2E7E05-8DBE-22F6-8B68-E82AC6BCF7ED}"/>
+              </a:ext>
+            </a:extLst>
+          </p:cNvPr>
+          <p:cNvPicPr>
+            <a:picLocks noChangeAspect="1" noChangeArrowheads="1"/>
+          </p:cNvPicPr>
+          <p:nvPr/>
+        </p:nvPicPr>
+        <p:blipFill rotWithShape="1">
+          <a:blip r:embed="rId2">
+            <a:extLst>
+              <a:ext uri="{28A0092B-C50C-407E-A947-70E740481C1C}">
+                <a14:useLocalDpi xmlns:a14="http://schemas.microsoft.com/office/drawing/2010/main" val="0"/>
+              </a:ext>
+            </a:extLst>
+          </a:blip>
+          <a:srcRect l="-1" r="60624"/>
+          <a:stretch/>
+        </p:blipFill>
+        <p:spPr bwMode="auto">
+          <a:xfrm>
+            <a:off x="7418803" y="3936834"/>
+            <a:ext cx="3574317" cy="2410421"/>
+          </a:xfrm>
+          <a:prstGeom prst="rect">
+            <a:avLst/>
+          </a:prstGeom>
+          <a:noFill/>
+          <a:extLst>
+            <a:ext uri="{909E8E84-426E-40DD-AFC4-6F175D3DCCD1}">
+              <a14:hiddenFill xmlns:a14="http://schemas.microsoft.com/office/drawing/2010/main">
+                <a:solidFill>
+                  <a:srgbClr val="FFFFFF"/>
+                </a:solidFill>
+              </a14:hiddenFill>
+            </a:ext>
+          </a:extLst>
+        </p:spPr>
+      </p:pic>
+    </p:spTree>
+    <p:extLst>
+      <p:ext uri="{BB962C8B-B14F-4D97-AF65-F5344CB8AC3E}">
+        <p14:creationId xmlns:p14="http://schemas.microsoft.com/office/powerpoint/2010/main" val="2062591409"/>
+      </p:ext>
+    </p:extLst>
+  </p:cSld>
+  <p:clrMapOvr>
+    <a:masterClrMapping/>
+  </p:clrMapOvr>
+</p:sld>
+</file>
+
+<file path=ppt/slides/slide9.xml><?xml version="1.0" encoding="utf-8"?>
+<p:sld xmlns:a="http://schemas.openxmlformats.org/drawingml/2006/main" xmlns:r="http://schemas.openxmlformats.org/officeDocument/2006/relationships" xmlns:p="http://schemas.openxmlformats.org/presentationml/2006/main">
+  <p:cSld>
+    <p:spTree>
+      <p:nvGrpSpPr>
+        <p:cNvPr id="1" name=""/>
+        <p:cNvGrpSpPr/>
+        <p:nvPr/>
+      </p:nvGrpSpPr>
+      <p:grpSpPr>
+        <a:xfrm>
+          <a:off x="0" y="0"/>
+          <a:ext cx="0" cy="0"/>
+          <a:chOff x="0" y="0"/>
+          <a:chExt cx="0" cy="0"/>
+        </a:xfrm>
+      </p:grpSpPr>
+      <p:sp>
+        <p:nvSpPr>
+          <p:cNvPr id="2" name="Título 1">
+            <a:extLst>
+              <a:ext uri="{FF2B5EF4-FFF2-40B4-BE49-F238E27FC236}">
+                <a16:creationId xmlns:a16="http://schemas.microsoft.com/office/drawing/2014/main" id="{2EC0235F-EC25-1467-0D8D-39597A31B8A2}"/>
+              </a:ext>
+            </a:extLst>
+          </p:cNvPr>
+          <p:cNvSpPr>
+            <a:spLocks noGrp="1"/>
+          </p:cNvSpPr>
+          <p:nvPr>
+            <p:ph type="title"/>
+          </p:nvPr>
+        </p:nvSpPr>
+        <p:spPr/>
+        <p:txBody>
+          <a:bodyPr/>
+          <a:lstStyle/>
+          <a:p>
+            <a:r>
+              <a:rPr lang="es-ES" dirty="0"/>
+              <a:t>ISSUES</a:t>
+            </a:r>
+          </a:p>
+        </p:txBody>
+      </p:sp>
+      <p:sp>
+        <p:nvSpPr>
+          <p:cNvPr id="3" name="Marcador de contenido 2">
+            <a:extLst>
+              <a:ext uri="{FF2B5EF4-FFF2-40B4-BE49-F238E27FC236}">
+                <a16:creationId xmlns:a16="http://schemas.microsoft.com/office/drawing/2014/main" id="{AF880626-E334-AE29-4239-F2DA178DBF50}"/>
+              </a:ext>
+            </a:extLst>
+          </p:cNvPr>
+          <p:cNvSpPr>
+            <a:spLocks noGrp="1"/>
+          </p:cNvSpPr>
+          <p:nvPr>
+            <p:ph idx="1"/>
+          </p:nvPr>
+        </p:nvSpPr>
+        <p:spPr>
+          <a:xfrm>
+            <a:off x="581192" y="2180497"/>
+            <a:ext cx="11029615" cy="1013800"/>
+          </a:xfrm>
+        </p:spPr>
+        <p:txBody>
+          <a:bodyPr/>
+          <a:lstStyle/>
+          <a:p>
+            <a:r>
+              <a:rPr lang="es-ES" dirty="0"/>
+              <a:t>Las etiquetas o </a:t>
+            </a:r>
+            <a:r>
+              <a:rPr lang="es-ES" dirty="0" err="1"/>
+              <a:t>labels</a:t>
+            </a:r>
+            <a:r>
+              <a:rPr lang="es-ES" dirty="0"/>
+              <a:t> ayudan a categorizar los Issues.</a:t>
+            </a:r>
+          </a:p>
+        </p:txBody>
+      </p:sp>
+      <p:sp>
+        <p:nvSpPr>
+          <p:cNvPr id="5" name="CuadroTexto 4">
+            <a:extLst>
+              <a:ext uri="{FF2B5EF4-FFF2-40B4-BE49-F238E27FC236}">
+                <a16:creationId xmlns:a16="http://schemas.microsoft.com/office/drawing/2014/main" id="{5ADC6404-7527-1C2F-2B51-7451ABC2C183}"/>
+              </a:ext>
+            </a:extLst>
+          </p:cNvPr>
+          <p:cNvSpPr txBox="1"/>
+          <p:nvPr/>
+        </p:nvSpPr>
+        <p:spPr>
+          <a:xfrm>
+            <a:off x="914400" y="3194296"/>
+            <a:ext cx="4785360" cy="2308324"/>
+          </a:xfrm>
+          <a:prstGeom prst="rect">
+            <a:avLst/>
+          </a:prstGeom>
+          <a:noFill/>
+        </p:spPr>
+        <p:txBody>
+          <a:bodyPr wrap="square">
+            <a:spAutoFit/>
+          </a:bodyPr>
+          <a:lstStyle/>
+          <a:p>
+            <a:pPr>
+              <a:buNone/>
+            </a:pPr>
+            <a:r>
+              <a:rPr lang="es-ES" dirty="0">
+                <a:solidFill>
+                  <a:schemeClr val="tx2"/>
+                </a:solidFill>
+              </a:rPr>
+              <a:t>Algunas etiquetas comunes son:</a:t>
+            </a:r>
+          </a:p>
+          <a:p>
+            <a:pPr>
+              <a:buNone/>
+            </a:pPr>
+            <a:endParaRPr lang="es-ES" dirty="0">
+              <a:solidFill>
+                <a:schemeClr val="tx2"/>
+              </a:solidFill>
+            </a:endParaRPr>
+          </a:p>
+          <a:p>
+            <a:pPr>
+              <a:buNone/>
+            </a:pPr>
+            <a:r>
+              <a:rPr lang="es-ES" dirty="0">
+                <a:solidFill>
+                  <a:schemeClr val="tx2"/>
+                </a:solidFill>
+              </a:rPr>
+              <a:t>- </a:t>
+            </a:r>
+            <a:r>
+              <a:rPr lang="es-ES" i="1" dirty="0">
+                <a:solidFill>
+                  <a:schemeClr val="tx2"/>
+                </a:solidFill>
+              </a:rPr>
+              <a:t>bug</a:t>
+            </a:r>
+            <a:r>
+              <a:rPr lang="es-ES" dirty="0">
+                <a:solidFill>
+                  <a:schemeClr val="tx2"/>
+                </a:solidFill>
+              </a:rPr>
+              <a:t>: indica un error.</a:t>
+            </a:r>
+          </a:p>
+          <a:p>
+            <a:pPr>
+              <a:buNone/>
+            </a:pPr>
+            <a:r>
+              <a:rPr lang="es-ES" dirty="0">
+                <a:solidFill>
+                  <a:schemeClr val="tx2"/>
+                </a:solidFill>
+              </a:rPr>
+              <a:t>- </a:t>
+            </a:r>
+            <a:r>
+              <a:rPr lang="es-ES" i="1" dirty="0" err="1">
+                <a:solidFill>
+                  <a:schemeClr val="tx2"/>
+                </a:solidFill>
+              </a:rPr>
+              <a:t>enhancement</a:t>
+            </a:r>
+            <a:r>
+              <a:rPr lang="es-ES" i="1" dirty="0">
+                <a:solidFill>
+                  <a:schemeClr val="tx2"/>
+                </a:solidFill>
+              </a:rPr>
+              <a:t>:</a:t>
+            </a:r>
+            <a:r>
+              <a:rPr lang="es-ES" dirty="0">
+                <a:solidFill>
+                  <a:schemeClr val="tx2"/>
+                </a:solidFill>
+              </a:rPr>
+              <a:t> indica una mejora o nueva funcionalidad.</a:t>
+            </a:r>
+          </a:p>
+          <a:p>
+            <a:pPr>
+              <a:buNone/>
+            </a:pPr>
+            <a:r>
+              <a:rPr lang="es-ES" dirty="0">
+                <a:solidFill>
+                  <a:schemeClr val="tx2"/>
+                </a:solidFill>
+              </a:rPr>
+              <a:t>- </a:t>
+            </a:r>
+            <a:r>
+              <a:rPr lang="es-ES" i="1" dirty="0" err="1">
+                <a:solidFill>
+                  <a:schemeClr val="tx2"/>
+                </a:solidFill>
+              </a:rPr>
+              <a:t>question</a:t>
+            </a:r>
+            <a:r>
+              <a:rPr lang="es-ES" dirty="0">
+                <a:solidFill>
+                  <a:schemeClr val="tx2"/>
+                </a:solidFill>
+              </a:rPr>
+              <a:t>: para dudas o aclaraciones.</a:t>
+            </a:r>
+          </a:p>
+          <a:p>
+            <a:r>
+              <a:rPr lang="es-ES" dirty="0">
+                <a:solidFill>
+                  <a:schemeClr val="tx2"/>
+                </a:solidFill>
+              </a:rPr>
+              <a:t>- </a:t>
+            </a:r>
+            <a:r>
+              <a:rPr lang="es-ES" i="1" dirty="0">
+                <a:solidFill>
+                  <a:schemeClr val="tx2"/>
+                </a:solidFill>
+              </a:rPr>
+              <a:t>documentación, urgente, fácil</a:t>
+            </a:r>
+            <a:r>
+              <a:rPr lang="es-ES" dirty="0">
+                <a:solidFill>
+                  <a:schemeClr val="tx2"/>
+                </a:solidFill>
+              </a:rPr>
+              <a:t>... (se pueden personalizar).</a:t>
+            </a:r>
+          </a:p>
+        </p:txBody>
+      </p:sp>
+      <p:pic>
+        <p:nvPicPr>
+          <p:cNvPr id="7170" name="Picture 2" descr="Sane GitHub Labels | by Dave Lunny | Medium">
+            <a:extLst>
+              <a:ext uri="{FF2B5EF4-FFF2-40B4-BE49-F238E27FC236}">
+                <a16:creationId xmlns:a16="http://schemas.microsoft.com/office/drawing/2014/main" id="{53A178AD-1AD8-DA2D-E7A5-743D82602625}"/>
+              </a:ext>
+            </a:extLst>
+          </p:cNvPr>
+          <p:cNvPicPr>
+            <a:picLocks noChangeAspect="1" noChangeArrowheads="1"/>
+          </p:cNvPicPr>
+          <p:nvPr/>
+        </p:nvPicPr>
+        <p:blipFill>
+          <a:blip r:embed="rId2">
+            <a:extLst>
+              <a:ext uri="{28A0092B-C50C-407E-A947-70E740481C1C}">
+                <a14:useLocalDpi xmlns:a14="http://schemas.microsoft.com/office/drawing/2010/main" val="0"/>
+              </a:ext>
+            </a:extLst>
+          </a:blip>
+          <a:srcRect/>
+          <a:stretch>
+            <a:fillRect/>
+          </a:stretch>
+        </p:blipFill>
+        <p:spPr bwMode="auto">
+          <a:xfrm>
+            <a:off x="6078293" y="3194296"/>
+            <a:ext cx="5622913" cy="3033784"/>
+          </a:xfrm>
+          <a:prstGeom prst="rect">
+            <a:avLst/>
+          </a:prstGeom>
+          <a:noFill/>
+          <a:extLst>
+            <a:ext uri="{909E8E84-426E-40DD-AFC4-6F175D3DCCD1}">
+              <a14:hiddenFill xmlns:a14="http://schemas.microsoft.com/office/drawing/2010/main">
+                <a:solidFill>
+                  <a:srgbClr val="FFFFFF"/>
+                </a:solidFill>
+              </a14:hiddenFill>
+            </a:ext>
+          </a:extLst>
+        </p:spPr>
+      </p:pic>
+    </p:spTree>
+    <p:extLst>
+      <p:ext uri="{BB962C8B-B14F-4D97-AF65-F5344CB8AC3E}">
+        <p14:creationId xmlns:p14="http://schemas.microsoft.com/office/powerpoint/2010/main" val="2812291280"/>
       </p:ext>
     </p:extLst>
   </p:cSld>

</xml_diff>